<commit_message>
Repairing Typo in ppt files
</commit_message>
<xml_diff>
--- a/Feature Engineering.pptx
+++ b/Feature Engineering.pptx
@@ -2025,7 +2025,7 @@
           <a:p>
             <a:fld id="{13BA5F5E-238C-4345-AEDE-B2DC0317D475}" type="datetimeFigureOut">
               <a:rPr lang="en-US" smtClean="0"/>
-              <a:t>10/20/2021</a:t>
+              <a:t>10/22/2021</a:t>
             </a:fld>
             <a:endParaRPr lang="en-US"/>
           </a:p>
@@ -2226,7 +2226,7 @@
           <a:p>
             <a:fld id="{13BA5F5E-238C-4345-AEDE-B2DC0317D475}" type="datetimeFigureOut">
               <a:rPr lang="en-US" smtClean="0"/>
-              <a:t>10/20/2021</a:t>
+              <a:t>10/22/2021</a:t>
             </a:fld>
             <a:endParaRPr lang="en-US"/>
           </a:p>
@@ -2437,7 +2437,7 @@
           <a:p>
             <a:fld id="{13BA5F5E-238C-4345-AEDE-B2DC0317D475}" type="datetimeFigureOut">
               <a:rPr lang="en-US" smtClean="0"/>
-              <a:t>10/20/2021</a:t>
+              <a:t>10/22/2021</a:t>
             </a:fld>
             <a:endParaRPr lang="en-US"/>
           </a:p>
@@ -2638,7 +2638,7 @@
           <a:p>
             <a:fld id="{13BA5F5E-238C-4345-AEDE-B2DC0317D475}" type="datetimeFigureOut">
               <a:rPr lang="en-US" smtClean="0"/>
-              <a:t>10/20/2021</a:t>
+              <a:t>10/22/2021</a:t>
             </a:fld>
             <a:endParaRPr lang="en-US"/>
           </a:p>
@@ -2916,7 +2916,7 @@
           <a:p>
             <a:fld id="{13BA5F5E-238C-4345-AEDE-B2DC0317D475}" type="datetimeFigureOut">
               <a:rPr lang="en-US" smtClean="0"/>
-              <a:t>10/20/2021</a:t>
+              <a:t>10/22/2021</a:t>
             </a:fld>
             <a:endParaRPr lang="en-US"/>
           </a:p>
@@ -3184,7 +3184,7 @@
           <a:p>
             <a:fld id="{13BA5F5E-238C-4345-AEDE-B2DC0317D475}" type="datetimeFigureOut">
               <a:rPr lang="en-US" smtClean="0"/>
-              <a:t>10/20/2021</a:t>
+              <a:t>10/22/2021</a:t>
             </a:fld>
             <a:endParaRPr lang="en-US"/>
           </a:p>
@@ -3599,7 +3599,7 @@
           <a:p>
             <a:fld id="{13BA5F5E-238C-4345-AEDE-B2DC0317D475}" type="datetimeFigureOut">
               <a:rPr lang="en-US" smtClean="0"/>
-              <a:t>10/20/2021</a:t>
+              <a:t>10/22/2021</a:t>
             </a:fld>
             <a:endParaRPr lang="en-US"/>
           </a:p>
@@ -3743,7 +3743,7 @@
           <a:p>
             <a:fld id="{13BA5F5E-238C-4345-AEDE-B2DC0317D475}" type="datetimeFigureOut">
               <a:rPr lang="en-US" smtClean="0"/>
-              <a:t>10/20/2021</a:t>
+              <a:t>10/22/2021</a:t>
             </a:fld>
             <a:endParaRPr lang="en-US"/>
           </a:p>
@@ -3859,7 +3859,7 @@
           <a:p>
             <a:fld id="{13BA5F5E-238C-4345-AEDE-B2DC0317D475}" type="datetimeFigureOut">
               <a:rPr lang="en-US" smtClean="0"/>
-              <a:t>10/20/2021</a:t>
+              <a:t>10/22/2021</a:t>
             </a:fld>
             <a:endParaRPr lang="en-US"/>
           </a:p>
@@ -4173,7 +4173,7 @@
           <a:p>
             <a:fld id="{13BA5F5E-238C-4345-AEDE-B2DC0317D475}" type="datetimeFigureOut">
               <a:rPr lang="en-US" smtClean="0"/>
-              <a:t>10/20/2021</a:t>
+              <a:t>10/22/2021</a:t>
             </a:fld>
             <a:endParaRPr lang="en-US"/>
           </a:p>
@@ -4464,7 +4464,7 @@
           <a:p>
             <a:fld id="{13BA5F5E-238C-4345-AEDE-B2DC0317D475}" type="datetimeFigureOut">
               <a:rPr lang="en-US" smtClean="0"/>
-              <a:t>10/20/2021</a:t>
+              <a:t>10/22/2021</a:t>
             </a:fld>
             <a:endParaRPr lang="en-US"/>
           </a:p>
@@ -4708,7 +4708,7 @@
           <a:p>
             <a:fld id="{13BA5F5E-238C-4345-AEDE-B2DC0317D475}" type="datetimeFigureOut">
               <a:rPr lang="en-US" smtClean="0"/>
-              <a:t>10/20/2021</a:t>
+              <a:t>10/22/2021</a:t>
             </a:fld>
             <a:endParaRPr lang="en-US"/>
           </a:p>
@@ -7533,7 +7533,7 @@
             </a:r>
             <a:r>
               <a:rPr lang="en-US" sz="2000" dirty="0" err="1"/>
-              <a:t>mengguakan</a:t>
+              <a:t>menggunakan</a:t>
             </a:r>
             <a:r>
               <a:rPr lang="en-US" sz="2000" dirty="0"/>

</xml_diff>